<commit_message>
Corrected error in computing optimal policy
</commit_message>
<xml_diff>
--- a/exercise4/Exercise4.pptx
+++ b/exercise4/Exercise4.pptx
@@ -30902,10 +30902,10 @@
         <mc:Choice xmlns:a14="http://schemas.microsoft.com/office/drawing/2010/main" Requires="a14">
           <p:sp>
             <p:nvSpPr>
-              <p:cNvPr id="7" name="TextBox 6">
+              <p:cNvPr id="16" name="TextBox 15">
                 <a:extLst>
                   <a:ext uri="{FF2B5EF4-FFF2-40B4-BE49-F238E27FC236}">
-                    <a16:creationId xmlns:a16="http://schemas.microsoft.com/office/drawing/2014/main" id="{64FCDDC0-F9CC-88A4-D094-566F49F1B65F}"/>
+                    <a16:creationId xmlns:a16="http://schemas.microsoft.com/office/drawing/2014/main" id="{99568E1B-8889-A603-0804-B4EEA34D1626}"/>
                   </a:ext>
                 </a:extLst>
               </p:cNvPr>
@@ -30914,7 +30914,7 @@
             </p:nvSpPr>
             <p:spPr>
               <a:xfrm>
-                <a:off x="838198" y="4715418"/>
+                <a:off x="838198" y="4802273"/>
                 <a:ext cx="2631143" cy="553998"/>
               </a:xfrm>
               <a:prstGeom prst="rect">
@@ -30939,18 +30939,6 @@
                       <m:jc m:val="centerGroup"/>
                     </m:oMathParaPr>
                     <m:oMath xmlns:m="http://schemas.openxmlformats.org/officeDocument/2006/math">
-                      <m:r>
-                        <a:rPr lang="en-GB" sz="3000" i="1" dirty="0" smtClean="0">
-                          <a:latin typeface="Cambria Math" panose="02040503050406030204" pitchFamily="18" charset="0"/>
-                        </a:rPr>
-                        <m:t>5</m:t>
-                      </m:r>
-                      <m:r>
-                        <a:rPr lang="en-GB" sz="3000" b="0" i="1" dirty="0" smtClean="0">
-                          <a:latin typeface="Cambria Math" panose="02040503050406030204" pitchFamily="18" charset="0"/>
-                        </a:rPr>
-                        <m:t>2.</m:t>
-                      </m:r>
                       <m:sSub>
                         <m:sSubPr>
                           <m:ctrlPr>
@@ -30960,6 +30948,12 @@
                           </m:ctrlPr>
                         </m:sSubPr>
                         <m:e>
+                          <m:r>
+                            <a:rPr lang="en-GB" sz="3000" b="0" i="1" dirty="0" smtClean="0">
+                              <a:latin typeface="Cambria Math" panose="02040503050406030204" pitchFamily="18" charset="0"/>
+                            </a:rPr>
+                            <m:t>52. </m:t>
+                          </m:r>
                           <m:r>
                             <a:rPr lang="el-GR" sz="3000" i="1" dirty="0">
                               <a:solidFill>
@@ -31010,7 +31004,7 @@
                               <a:effectLst/>
                               <a:latin typeface="Cambria Math" panose="02040503050406030204" pitchFamily="18" charset="0"/>
                             </a:rPr>
-                            <m:t>𝐸</m:t>
+                            <m:t>𝐹</m:t>
                           </m:r>
                         </m:e>
                       </m:d>
@@ -31045,10 +31039,10 @@
         <mc:Fallback>
           <p:sp>
             <p:nvSpPr>
-              <p:cNvPr id="7" name="TextBox 6">
+              <p:cNvPr id="16" name="TextBox 15">
                 <a:extLst>
                   <a:ext uri="{FF2B5EF4-FFF2-40B4-BE49-F238E27FC236}">
-                    <a16:creationId xmlns:a16="http://schemas.microsoft.com/office/drawing/2014/main" id="{64FCDDC0-F9CC-88A4-D094-566F49F1B65F}"/>
+                    <a16:creationId xmlns:a16="http://schemas.microsoft.com/office/drawing/2014/main" id="{99568E1B-8889-A603-0804-B4EEA34D1626}"/>
                   </a:ext>
                 </a:extLst>
               </p:cNvPr>
@@ -31059,7 +31053,7 @@
             </p:nvSpPr>
             <p:spPr>
               <a:xfrm>
-                <a:off x="838198" y="4715418"/>
+                <a:off x="838198" y="4802273"/>
                 <a:ext cx="2631143" cy="553998"/>
               </a:xfrm>
               <a:prstGeom prst="rect">
@@ -31068,7 +31062,7 @@
               <a:blipFill>
                 <a:blip r:embed="rId7"/>
                 <a:stretch>
-                  <a:fillRect b="-17021"/>
+                  <a:fillRect b="-16667"/>
                 </a:stretch>
               </a:blipFill>
               <a:ln w="38100">
@@ -31096,10 +31090,10 @@
         <mc:Choice xmlns:a14="http://schemas.microsoft.com/office/drawing/2010/main" Requires="a14">
           <p:sp>
             <p:nvSpPr>
-              <p:cNvPr id="16" name="TextBox 15">
+              <p:cNvPr id="17" name="TextBox 16">
                 <a:extLst>
                   <a:ext uri="{FF2B5EF4-FFF2-40B4-BE49-F238E27FC236}">
-                    <a16:creationId xmlns:a16="http://schemas.microsoft.com/office/drawing/2014/main" id="{99568E1B-8889-A603-0804-B4EEA34D1626}"/>
+                    <a16:creationId xmlns:a16="http://schemas.microsoft.com/office/drawing/2014/main" id="{0550DF3A-3A9A-7F98-0C40-F445990A2579}"/>
                   </a:ext>
                 </a:extLst>
               </p:cNvPr>
@@ -31108,7 +31102,7 @@
             </p:nvSpPr>
             <p:spPr>
               <a:xfrm>
-                <a:off x="838198" y="5504904"/>
+                <a:off x="838198" y="5591759"/>
                 <a:ext cx="2631143" cy="553998"/>
               </a:xfrm>
               <a:prstGeom prst="rect">
@@ -31198,194 +31192,6 @@
                               <a:effectLst/>
                               <a:latin typeface="Cambria Math" panose="02040503050406030204" pitchFamily="18" charset="0"/>
                             </a:rPr>
-                            <m:t>𝐹</m:t>
-                          </m:r>
-                        </m:e>
-                      </m:d>
-                      <m:r>
-                        <a:rPr lang="en-PH" sz="3000" b="0" i="1" u="none" strike="noStrike" dirty="0">
-                          <a:solidFill>
-                            <a:srgbClr val="000000"/>
-                          </a:solidFill>
-                          <a:effectLst/>
-                          <a:latin typeface="Cambria Math" panose="02040503050406030204" pitchFamily="18" charset="0"/>
-                        </a:rPr>
-                        <m:t>=</m:t>
-                      </m:r>
-                      <m:r>
-                        <a:rPr lang="en-GB" sz="3000" b="0" i="1" u="none" strike="noStrike" dirty="0" smtClean="0">
-                          <a:solidFill>
-                            <a:srgbClr val="000000"/>
-                          </a:solidFill>
-                          <a:effectLst/>
-                          <a:latin typeface="Cambria Math" panose="02040503050406030204" pitchFamily="18" charset="0"/>
-                        </a:rPr>
-                        <m:t> ?</m:t>
-                      </m:r>
-                    </m:oMath>
-                  </m:oMathPara>
-                </a14:m>
-                <a:endParaRPr lang="en-US" sz="3000" dirty="0"/>
-              </a:p>
-            </p:txBody>
-          </p:sp>
-        </mc:Choice>
-        <mc:Fallback>
-          <p:sp>
-            <p:nvSpPr>
-              <p:cNvPr id="16" name="TextBox 15">
-                <a:extLst>
-                  <a:ext uri="{FF2B5EF4-FFF2-40B4-BE49-F238E27FC236}">
-                    <a16:creationId xmlns:a16="http://schemas.microsoft.com/office/drawing/2014/main" id="{99568E1B-8889-A603-0804-B4EEA34D1626}"/>
-                  </a:ext>
-                </a:extLst>
-              </p:cNvPr>
-              <p:cNvSpPr txBox="1">
-                <a:spLocks noRot="1" noChangeAspect="1" noMove="1" noResize="1" noEditPoints="1" noAdjustHandles="1" noChangeArrowheads="1" noChangeShapeType="1" noTextEdit="1"/>
-              </p:cNvSpPr>
-              <p:nvPr/>
-            </p:nvSpPr>
-            <p:spPr>
-              <a:xfrm>
-                <a:off x="838198" y="5504904"/>
-                <a:ext cx="2631143" cy="553998"/>
-              </a:xfrm>
-              <a:prstGeom prst="rect">
-                <a:avLst/>
-              </a:prstGeom>
-              <a:blipFill>
-                <a:blip r:embed="rId8"/>
-                <a:stretch>
-                  <a:fillRect b="-19149"/>
-                </a:stretch>
-              </a:blipFill>
-              <a:ln w="38100">
-                <a:solidFill>
-                  <a:schemeClr val="tx1"/>
-                </a:solidFill>
-              </a:ln>
-            </p:spPr>
-            <p:txBody>
-              <a:bodyPr/>
-              <a:lstStyle/>
-              <a:p>
-                <a:r>
-                  <a:rPr lang="en-US">
-                    <a:noFill/>
-                  </a:rPr>
-                  <a:t> </a:t>
-                </a:r>
-              </a:p>
-            </p:txBody>
-          </p:sp>
-        </mc:Fallback>
-      </mc:AlternateContent>
-      <mc:AlternateContent xmlns:mc="http://schemas.openxmlformats.org/markup-compatibility/2006">
-        <mc:Choice xmlns:a14="http://schemas.microsoft.com/office/drawing/2010/main" Requires="a14">
-          <p:sp>
-            <p:nvSpPr>
-              <p:cNvPr id="17" name="TextBox 16">
-                <a:extLst>
-                  <a:ext uri="{FF2B5EF4-FFF2-40B4-BE49-F238E27FC236}">
-                    <a16:creationId xmlns:a16="http://schemas.microsoft.com/office/drawing/2014/main" id="{0550DF3A-3A9A-7F98-0C40-F445990A2579}"/>
-                  </a:ext>
-                </a:extLst>
-              </p:cNvPr>
-              <p:cNvSpPr txBox="1"/>
-              <p:nvPr/>
-            </p:nvSpPr>
-            <p:spPr>
-              <a:xfrm>
-                <a:off x="838198" y="6294390"/>
-                <a:ext cx="2631143" cy="553998"/>
-              </a:xfrm>
-              <a:prstGeom prst="rect">
-                <a:avLst/>
-              </a:prstGeom>
-              <a:noFill/>
-              <a:ln w="38100">
-                <a:solidFill>
-                  <a:schemeClr val="tx1"/>
-                </a:solidFill>
-              </a:ln>
-            </p:spPr>
-            <p:txBody>
-              <a:bodyPr wrap="square">
-                <a:spAutoFit/>
-              </a:bodyPr>
-              <a:lstStyle/>
-              <a:p>
-                <a14:m>
-                  <m:oMathPara xmlns:m="http://schemas.openxmlformats.org/officeDocument/2006/math">
-                    <m:oMathParaPr>
-                      <m:jc m:val="centerGroup"/>
-                    </m:oMathParaPr>
-                    <m:oMath xmlns:m="http://schemas.openxmlformats.org/officeDocument/2006/math">
-                      <m:sSub>
-                        <m:sSubPr>
-                          <m:ctrlPr>
-                            <a:rPr lang="en-US" sz="3000" i="1" dirty="0" smtClean="0">
-                              <a:latin typeface="Cambria Math" panose="02040503050406030204" pitchFamily="18" charset="0"/>
-                            </a:rPr>
-                          </m:ctrlPr>
-                        </m:sSubPr>
-                        <m:e>
-                          <m:r>
-                            <a:rPr lang="en-GB" sz="3000" b="0" i="1" dirty="0" smtClean="0">
-                              <a:latin typeface="Cambria Math" panose="02040503050406030204" pitchFamily="18" charset="0"/>
-                            </a:rPr>
-                            <m:t>54. </m:t>
-                          </m:r>
-                          <m:r>
-                            <a:rPr lang="el-GR" sz="3000" i="1" dirty="0">
-                              <a:solidFill>
-                                <a:srgbClr val="000000"/>
-                              </a:solidFill>
-                              <a:latin typeface="Cambria Math" panose="02040503050406030204" pitchFamily="18" charset="0"/>
-                            </a:rPr>
-                            <m:t>𝜋</m:t>
-                          </m:r>
-                        </m:e>
-                        <m:sub>
-                          <m:r>
-                            <a:rPr lang="en-GB" sz="3000" b="0" i="1" dirty="0" smtClean="0">
-                              <a:latin typeface="Cambria Math" panose="02040503050406030204" pitchFamily="18" charset="0"/>
-                            </a:rPr>
-                            <m:t>∗</m:t>
-                          </m:r>
-                        </m:sub>
-                      </m:sSub>
-                      <m:r>
-                        <a:rPr lang="el-GR" sz="3000" b="0" i="1" u="none" strike="noStrike" dirty="0" smtClean="0">
-                          <a:solidFill>
-                            <a:srgbClr val="000000"/>
-                          </a:solidFill>
-                          <a:effectLst/>
-                          <a:latin typeface="Cambria Math" panose="02040503050406030204" pitchFamily="18" charset="0"/>
-                        </a:rPr>
-                        <m:t> </m:t>
-                      </m:r>
-                      <m:d>
-                        <m:dPr>
-                          <m:ctrlPr>
-                            <a:rPr lang="el-GR" sz="3000" b="0" i="1" u="none" strike="noStrike" dirty="0" smtClean="0">
-                              <a:solidFill>
-                                <a:srgbClr val="000000"/>
-                              </a:solidFill>
-                              <a:effectLst/>
-                              <a:latin typeface="Cambria Math" panose="02040503050406030204" pitchFamily="18" charset="0"/>
-                            </a:rPr>
-                          </m:ctrlPr>
-                        </m:dPr>
-                        <m:e>
-                          <m:r>
-                            <a:rPr lang="en-GB" sz="3000" b="0" i="1" u="none" strike="noStrike" dirty="0" smtClean="0">
-                              <a:solidFill>
-                                <a:srgbClr val="000000"/>
-                              </a:solidFill>
-                              <a:effectLst/>
-                              <a:latin typeface="Cambria Math" panose="02040503050406030204" pitchFamily="18" charset="0"/>
-                            </a:rPr>
                             <m:t>𝐻</m:t>
                           </m:r>
                         </m:e>
@@ -31435,16 +31241,16 @@
             </p:nvSpPr>
             <p:spPr>
               <a:xfrm>
-                <a:off x="838198" y="6294390"/>
+                <a:off x="838198" y="5591759"/>
                 <a:ext cx="2631143" cy="553998"/>
               </a:xfrm>
               <a:prstGeom prst="rect">
                 <a:avLst/>
               </a:prstGeom>
               <a:blipFill>
-                <a:blip r:embed="rId9"/>
+                <a:blip r:embed="rId8"/>
                 <a:stretch>
-                  <a:fillRect b="-19149"/>
+                  <a:fillRect b="-16667"/>
                 </a:stretch>
               </a:blipFill>
               <a:ln w="38100">
@@ -31973,7 +31779,7 @@
                           </a:solidFill>
                           <a:latin typeface="Cambria Math" panose="02040503050406030204" pitchFamily="18" charset="0"/>
                         </a:rPr>
-                        <m:t>5. </m:t>
+                        <m:t>4. </m:t>
                       </m:r>
                       <m:r>
                         <a:rPr lang="en-GB" b="0" i="1" dirty="0" smtClean="0">
@@ -32244,7 +32050,7 @@
                           </a:solidFill>
                           <a:latin typeface="Cambria Math" panose="02040503050406030204" pitchFamily="18" charset="0"/>
                         </a:rPr>
-                        <m:t>6. </m:t>
+                        <m:t>5. </m:t>
                       </m:r>
                       <m:r>
                         <a:rPr lang="en-GB" b="0" i="1" dirty="0" smtClean="0">

</xml_diff>

<commit_message>
Corrected missing state E
</commit_message>
<xml_diff>
--- a/exercise4/Exercise4.pptx
+++ b/exercise4/Exercise4.pptx
@@ -28032,7 +28032,379 @@
             </p:nvSpPr>
             <p:spPr>
               <a:xfrm>
-                <a:off x="838198" y="4715418"/>
+                <a:off x="838198" y="5364948"/>
+                <a:ext cx="2469778" cy="553998"/>
+              </a:xfrm>
+              <a:prstGeom prst="rect">
+                <a:avLst/>
+              </a:prstGeom>
+              <a:noFill/>
+              <a:ln w="38100">
+                <a:solidFill>
+                  <a:schemeClr val="tx1"/>
+                </a:solidFill>
+              </a:ln>
+            </p:spPr>
+            <p:txBody>
+              <a:bodyPr wrap="square">
+                <a:spAutoFit/>
+              </a:bodyPr>
+              <a:lstStyle/>
+              <a:p>
+                <a14:m>
+                  <m:oMathPara xmlns:m="http://schemas.openxmlformats.org/officeDocument/2006/math">
+                    <m:oMathParaPr>
+                      <m:jc m:val="centerGroup"/>
+                    </m:oMathParaPr>
+                    <m:oMath xmlns:m="http://schemas.openxmlformats.org/officeDocument/2006/math">
+                      <m:sSub>
+                        <m:sSubPr>
+                          <m:ctrlPr>
+                            <a:rPr lang="en-US" sz="3000" i="1" dirty="0" smtClean="0">
+                              <a:latin typeface="Cambria Math" panose="02040503050406030204" pitchFamily="18" charset="0"/>
+                            </a:rPr>
+                          </m:ctrlPr>
+                        </m:sSubPr>
+                        <m:e>
+                          <m:r>
+                            <a:rPr lang="en-GB" sz="3000" b="0" i="1" dirty="0" smtClean="0">
+                              <a:latin typeface="Cambria Math" panose="02040503050406030204" pitchFamily="18" charset="0"/>
+                            </a:rPr>
+                            <m:t>43.</m:t>
+                          </m:r>
+                          <m:r>
+                            <a:rPr lang="en-GB" sz="3000" b="0" i="1" dirty="0" smtClean="0">
+                              <a:latin typeface="Cambria Math" panose="02040503050406030204" pitchFamily="18" charset="0"/>
+                            </a:rPr>
+                            <m:t>𝑣</m:t>
+                          </m:r>
+                        </m:e>
+                        <m:sub>
+                          <m:r>
+                            <a:rPr lang="en-GB" sz="3000" b="0" i="1" dirty="0" smtClean="0">
+                              <a:latin typeface="Cambria Math" panose="02040503050406030204" pitchFamily="18" charset="0"/>
+                            </a:rPr>
+                            <m:t>∗</m:t>
+                          </m:r>
+                        </m:sub>
+                      </m:sSub>
+                      <m:r>
+                        <a:rPr lang="el-GR" sz="3000" b="0" i="1" u="none" strike="noStrike" dirty="0" smtClean="0">
+                          <a:solidFill>
+                            <a:srgbClr val="000000"/>
+                          </a:solidFill>
+                          <a:effectLst/>
+                          <a:latin typeface="Cambria Math" panose="02040503050406030204" pitchFamily="18" charset="0"/>
+                        </a:rPr>
+                        <m:t> </m:t>
+                      </m:r>
+                      <m:d>
+                        <m:dPr>
+                          <m:ctrlPr>
+                            <a:rPr lang="el-GR" sz="3000" b="0" i="1" u="none" strike="noStrike" dirty="0" smtClean="0">
+                              <a:solidFill>
+                                <a:srgbClr val="000000"/>
+                              </a:solidFill>
+                              <a:effectLst/>
+                              <a:latin typeface="Cambria Math" panose="02040503050406030204" pitchFamily="18" charset="0"/>
+                            </a:rPr>
+                          </m:ctrlPr>
+                        </m:dPr>
+                        <m:e>
+                          <m:r>
+                            <a:rPr lang="en-GB" sz="3000" b="0" i="1" u="none" strike="noStrike" dirty="0" smtClean="0">
+                              <a:solidFill>
+                                <a:srgbClr val="000000"/>
+                              </a:solidFill>
+                              <a:effectLst/>
+                              <a:latin typeface="Cambria Math" panose="02040503050406030204" pitchFamily="18" charset="0"/>
+                            </a:rPr>
+                            <m:t>𝐹</m:t>
+                          </m:r>
+                        </m:e>
+                      </m:d>
+                      <m:r>
+                        <a:rPr lang="en-PH" sz="3000" b="0" i="1" u="none" strike="noStrike" dirty="0">
+                          <a:solidFill>
+                            <a:srgbClr val="000000"/>
+                          </a:solidFill>
+                          <a:effectLst/>
+                          <a:latin typeface="Cambria Math" panose="02040503050406030204" pitchFamily="18" charset="0"/>
+                        </a:rPr>
+                        <m:t>=</m:t>
+                      </m:r>
+                      <m:r>
+                        <a:rPr lang="en-GB" sz="3000" b="0" i="1" u="none" strike="noStrike" dirty="0" smtClean="0">
+                          <a:solidFill>
+                            <a:srgbClr val="000000"/>
+                          </a:solidFill>
+                          <a:effectLst/>
+                          <a:latin typeface="Cambria Math" panose="02040503050406030204" pitchFamily="18" charset="0"/>
+                        </a:rPr>
+                        <m:t> ?</m:t>
+                      </m:r>
+                    </m:oMath>
+                  </m:oMathPara>
+                </a14:m>
+                <a:endParaRPr lang="en-US" sz="3000" dirty="0"/>
+              </a:p>
+            </p:txBody>
+          </p:sp>
+        </mc:Choice>
+        <mc:Fallback>
+          <p:sp>
+            <p:nvSpPr>
+              <p:cNvPr id="22" name="TextBox 21">
+                <a:extLst>
+                  <a:ext uri="{FF2B5EF4-FFF2-40B4-BE49-F238E27FC236}">
+                    <a16:creationId xmlns:a16="http://schemas.microsoft.com/office/drawing/2014/main" id="{39D89C0F-FC02-7CD6-C05B-B30C2BCA1885}"/>
+                  </a:ext>
+                </a:extLst>
+              </p:cNvPr>
+              <p:cNvSpPr txBox="1">
+                <a:spLocks noRot="1" noChangeAspect="1" noMove="1" noResize="1" noEditPoints="1" noAdjustHandles="1" noChangeArrowheads="1" noChangeShapeType="1" noTextEdit="1"/>
+              </p:cNvSpPr>
+              <p:nvPr/>
+            </p:nvSpPr>
+            <p:spPr>
+              <a:xfrm>
+                <a:off x="838198" y="5364948"/>
+                <a:ext cx="2469778" cy="553998"/>
+              </a:xfrm>
+              <a:prstGeom prst="rect">
+                <a:avLst/>
+              </a:prstGeom>
+              <a:blipFill>
+                <a:blip r:embed="rId7"/>
+                <a:stretch>
+                  <a:fillRect b="-18750"/>
+                </a:stretch>
+              </a:blipFill>
+              <a:ln w="38100">
+                <a:solidFill>
+                  <a:schemeClr val="tx1"/>
+                </a:solidFill>
+              </a:ln>
+            </p:spPr>
+            <p:txBody>
+              <a:bodyPr/>
+              <a:lstStyle/>
+              <a:p>
+                <a:r>
+                  <a:rPr lang="en-US">
+                    <a:noFill/>
+                  </a:rPr>
+                  <a:t> </a:t>
+                </a:r>
+              </a:p>
+            </p:txBody>
+          </p:sp>
+        </mc:Fallback>
+      </mc:AlternateContent>
+      <mc:AlternateContent xmlns:mc="http://schemas.openxmlformats.org/markup-compatibility/2006">
+        <mc:Choice xmlns:a14="http://schemas.microsoft.com/office/drawing/2010/main" Requires="a14">
+          <p:sp>
+            <p:nvSpPr>
+              <p:cNvPr id="23" name="TextBox 22">
+                <a:extLst>
+                  <a:ext uri="{FF2B5EF4-FFF2-40B4-BE49-F238E27FC236}">
+                    <a16:creationId xmlns:a16="http://schemas.microsoft.com/office/drawing/2014/main" id="{FE433754-7496-66CB-5ACE-B08C37301D0C}"/>
+                  </a:ext>
+                </a:extLst>
+              </p:cNvPr>
+              <p:cNvSpPr txBox="1"/>
+              <p:nvPr/>
+            </p:nvSpPr>
+            <p:spPr>
+              <a:xfrm>
+                <a:off x="838198" y="6135135"/>
+                <a:ext cx="2469778" cy="553998"/>
+              </a:xfrm>
+              <a:prstGeom prst="rect">
+                <a:avLst/>
+              </a:prstGeom>
+              <a:noFill/>
+              <a:ln w="38100">
+                <a:solidFill>
+                  <a:schemeClr val="tx1"/>
+                </a:solidFill>
+              </a:ln>
+            </p:spPr>
+            <p:txBody>
+              <a:bodyPr wrap="square">
+                <a:spAutoFit/>
+              </a:bodyPr>
+              <a:lstStyle/>
+              <a:p>
+                <a14:m>
+                  <m:oMathPara xmlns:m="http://schemas.openxmlformats.org/officeDocument/2006/math">
+                    <m:oMathParaPr>
+                      <m:jc m:val="centerGroup"/>
+                    </m:oMathParaPr>
+                    <m:oMath xmlns:m="http://schemas.openxmlformats.org/officeDocument/2006/math">
+                      <m:sSub>
+                        <m:sSubPr>
+                          <m:ctrlPr>
+                            <a:rPr lang="en-US" sz="3000" i="1" dirty="0" smtClean="0">
+                              <a:latin typeface="Cambria Math" panose="02040503050406030204" pitchFamily="18" charset="0"/>
+                            </a:rPr>
+                          </m:ctrlPr>
+                        </m:sSubPr>
+                        <m:e>
+                          <m:r>
+                            <a:rPr lang="en-GB" sz="3000" i="1" dirty="0">
+                              <a:latin typeface="Cambria Math" panose="02040503050406030204" pitchFamily="18" charset="0"/>
+                            </a:rPr>
+                            <m:t>4</m:t>
+                          </m:r>
+                          <m:r>
+                            <a:rPr lang="en-GB" sz="3000" b="0" i="1" dirty="0" smtClean="0">
+                              <a:latin typeface="Cambria Math" panose="02040503050406030204" pitchFamily="18" charset="0"/>
+                            </a:rPr>
+                            <m:t>4</m:t>
+                          </m:r>
+                          <m:r>
+                            <a:rPr lang="en-GB" sz="3000" i="1" dirty="0">
+                              <a:latin typeface="Cambria Math" panose="02040503050406030204" pitchFamily="18" charset="0"/>
+                            </a:rPr>
+                            <m:t>.</m:t>
+                          </m:r>
+                          <m:r>
+                            <a:rPr lang="en-GB" sz="3000" i="1" dirty="0">
+                              <a:latin typeface="Cambria Math" panose="02040503050406030204" pitchFamily="18" charset="0"/>
+                            </a:rPr>
+                            <m:t>𝑣</m:t>
+                          </m:r>
+                        </m:e>
+                        <m:sub>
+                          <m:r>
+                            <a:rPr lang="en-GB" sz="3000" i="1" dirty="0">
+                              <a:latin typeface="Cambria Math" panose="02040503050406030204" pitchFamily="18" charset="0"/>
+                            </a:rPr>
+                            <m:t>∗</m:t>
+                          </m:r>
+                        </m:sub>
+                      </m:sSub>
+                      <m:d>
+                        <m:dPr>
+                          <m:ctrlPr>
+                            <a:rPr lang="el-GR" sz="3000" b="0" i="1" u="none" strike="noStrike" dirty="0" smtClean="0">
+                              <a:solidFill>
+                                <a:srgbClr val="000000"/>
+                              </a:solidFill>
+                              <a:effectLst/>
+                              <a:latin typeface="Cambria Math" panose="02040503050406030204" pitchFamily="18" charset="0"/>
+                            </a:rPr>
+                          </m:ctrlPr>
+                        </m:dPr>
+                        <m:e>
+                          <m:r>
+                            <a:rPr lang="en-GB" sz="3000" b="0" i="1" u="none" strike="noStrike" dirty="0" smtClean="0">
+                              <a:solidFill>
+                                <a:srgbClr val="000000"/>
+                              </a:solidFill>
+                              <a:effectLst/>
+                              <a:latin typeface="Cambria Math" panose="02040503050406030204" pitchFamily="18" charset="0"/>
+                            </a:rPr>
+                            <m:t>𝐻</m:t>
+                          </m:r>
+                        </m:e>
+                      </m:d>
+                      <m:r>
+                        <a:rPr lang="en-PH" sz="3000" b="0" i="1" u="none" strike="noStrike" dirty="0" smtClean="0">
+                          <a:solidFill>
+                            <a:srgbClr val="000000"/>
+                          </a:solidFill>
+                          <a:effectLst/>
+                          <a:latin typeface="Cambria Math" panose="02040503050406030204" pitchFamily="18" charset="0"/>
+                        </a:rPr>
+                        <m:t>=</m:t>
+                      </m:r>
+                      <m:r>
+                        <a:rPr lang="en-GB" sz="3000" b="0" i="1" u="none" strike="noStrike" dirty="0" smtClean="0">
+                          <a:solidFill>
+                            <a:srgbClr val="000000"/>
+                          </a:solidFill>
+                          <a:effectLst/>
+                          <a:latin typeface="Cambria Math" panose="02040503050406030204" pitchFamily="18" charset="0"/>
+                        </a:rPr>
+                        <m:t> ?</m:t>
+                      </m:r>
+                    </m:oMath>
+                  </m:oMathPara>
+                </a14:m>
+                <a:endParaRPr lang="en-US" sz="3000" dirty="0"/>
+              </a:p>
+            </p:txBody>
+          </p:sp>
+        </mc:Choice>
+        <mc:Fallback>
+          <p:sp>
+            <p:nvSpPr>
+              <p:cNvPr id="23" name="TextBox 22">
+                <a:extLst>
+                  <a:ext uri="{FF2B5EF4-FFF2-40B4-BE49-F238E27FC236}">
+                    <a16:creationId xmlns:a16="http://schemas.microsoft.com/office/drawing/2014/main" id="{FE433754-7496-66CB-5ACE-B08C37301D0C}"/>
+                  </a:ext>
+                </a:extLst>
+              </p:cNvPr>
+              <p:cNvSpPr txBox="1">
+                <a:spLocks noRot="1" noChangeAspect="1" noMove="1" noResize="1" noEditPoints="1" noAdjustHandles="1" noChangeArrowheads="1" noChangeShapeType="1" noTextEdit="1"/>
+              </p:cNvSpPr>
+              <p:nvPr/>
+            </p:nvSpPr>
+            <p:spPr>
+              <a:xfrm>
+                <a:off x="838198" y="6135135"/>
+                <a:ext cx="2469778" cy="553998"/>
+              </a:xfrm>
+              <a:prstGeom prst="rect">
+                <a:avLst/>
+              </a:prstGeom>
+              <a:blipFill>
+                <a:blip r:embed="rId8"/>
+                <a:stretch>
+                  <a:fillRect b="-19149"/>
+                </a:stretch>
+              </a:blipFill>
+              <a:ln w="38100">
+                <a:solidFill>
+                  <a:schemeClr val="tx1"/>
+                </a:solidFill>
+              </a:ln>
+            </p:spPr>
+            <p:txBody>
+              <a:bodyPr/>
+              <a:lstStyle/>
+              <a:p>
+                <a:r>
+                  <a:rPr lang="en-US">
+                    <a:noFill/>
+                  </a:rPr>
+                  <a:t> </a:t>
+                </a:r>
+              </a:p>
+            </p:txBody>
+          </p:sp>
+        </mc:Fallback>
+      </mc:AlternateContent>
+      <mc:AlternateContent xmlns:mc="http://schemas.openxmlformats.org/markup-compatibility/2006">
+        <mc:Choice xmlns:a14="http://schemas.microsoft.com/office/drawing/2010/main" Requires="a14">
+          <p:sp>
+            <p:nvSpPr>
+              <p:cNvPr id="28" name="TextBox 27">
+                <a:extLst>
+                  <a:ext uri="{FF2B5EF4-FFF2-40B4-BE49-F238E27FC236}">
+                    <a16:creationId xmlns:a16="http://schemas.microsoft.com/office/drawing/2014/main" id="{10B5F5F2-3168-87FE-4365-3B24A0992696}"/>
+                  </a:ext>
+                </a:extLst>
+              </p:cNvPr>
+              <p:cNvSpPr txBox="1"/>
+              <p:nvPr/>
+            </p:nvSpPr>
+            <p:spPr>
+              <a:xfrm>
+                <a:off x="838198" y="4594762"/>
                 <a:ext cx="2469778" cy="553998"/>
               </a:xfrm>
               <a:prstGeom prst="rect">
@@ -28119,7 +28491,7 @@
                               <a:effectLst/>
                               <a:latin typeface="Cambria Math" panose="02040503050406030204" pitchFamily="18" charset="0"/>
                             </a:rPr>
-                            <m:t>𝐹</m:t>
+                            <m:t>𝐸</m:t>
                           </m:r>
                         </m:e>
                       </m:d>
@@ -28154,10 +28526,10 @@
         <mc:Fallback>
           <p:sp>
             <p:nvSpPr>
-              <p:cNvPr id="22" name="TextBox 21">
+              <p:cNvPr id="28" name="TextBox 27">
                 <a:extLst>
                   <a:ext uri="{FF2B5EF4-FFF2-40B4-BE49-F238E27FC236}">
-                    <a16:creationId xmlns:a16="http://schemas.microsoft.com/office/drawing/2014/main" id="{39D89C0F-FC02-7CD6-C05B-B30C2BCA1885}"/>
+                    <a16:creationId xmlns:a16="http://schemas.microsoft.com/office/drawing/2014/main" id="{10B5F5F2-3168-87FE-4365-3B24A0992696}"/>
                   </a:ext>
                 </a:extLst>
               </p:cNvPr>
@@ -28168,203 +28540,16 @@
             </p:nvSpPr>
             <p:spPr>
               <a:xfrm>
-                <a:off x="838198" y="4715418"/>
+                <a:off x="838198" y="4594762"/>
                 <a:ext cx="2469778" cy="553998"/>
               </a:xfrm>
               <a:prstGeom prst="rect">
                 <a:avLst/>
               </a:prstGeom>
               <a:blipFill>
-                <a:blip r:embed="rId7"/>
+                <a:blip r:embed="rId9"/>
                 <a:stretch>
-                  <a:fillRect b="-17021"/>
-                </a:stretch>
-              </a:blipFill>
-              <a:ln w="38100">
-                <a:solidFill>
-                  <a:schemeClr val="tx1"/>
-                </a:solidFill>
-              </a:ln>
-            </p:spPr>
-            <p:txBody>
-              <a:bodyPr/>
-              <a:lstStyle/>
-              <a:p>
-                <a:r>
-                  <a:rPr lang="en-US">
-                    <a:noFill/>
-                  </a:rPr>
-                  <a:t> </a:t>
-                </a:r>
-              </a:p>
-            </p:txBody>
-          </p:sp>
-        </mc:Fallback>
-      </mc:AlternateContent>
-      <mc:AlternateContent xmlns:mc="http://schemas.openxmlformats.org/markup-compatibility/2006">
-        <mc:Choice xmlns:a14="http://schemas.microsoft.com/office/drawing/2010/main" Requires="a14">
-          <p:sp>
-            <p:nvSpPr>
-              <p:cNvPr id="23" name="TextBox 22">
-                <a:extLst>
-                  <a:ext uri="{FF2B5EF4-FFF2-40B4-BE49-F238E27FC236}">
-                    <a16:creationId xmlns:a16="http://schemas.microsoft.com/office/drawing/2014/main" id="{FE433754-7496-66CB-5ACE-B08C37301D0C}"/>
-                  </a:ext>
-                </a:extLst>
-              </p:cNvPr>
-              <p:cNvSpPr txBox="1"/>
-              <p:nvPr/>
-            </p:nvSpPr>
-            <p:spPr>
-              <a:xfrm>
-                <a:off x="838198" y="5586960"/>
-                <a:ext cx="2469778" cy="553998"/>
-              </a:xfrm>
-              <a:prstGeom prst="rect">
-                <a:avLst/>
-              </a:prstGeom>
-              <a:noFill/>
-              <a:ln w="38100">
-                <a:solidFill>
-                  <a:schemeClr val="tx1"/>
-                </a:solidFill>
-              </a:ln>
-            </p:spPr>
-            <p:txBody>
-              <a:bodyPr wrap="square">
-                <a:spAutoFit/>
-              </a:bodyPr>
-              <a:lstStyle/>
-              <a:p>
-                <a14:m>
-                  <m:oMathPara xmlns:m="http://schemas.openxmlformats.org/officeDocument/2006/math">
-                    <m:oMathParaPr>
-                      <m:jc m:val="centerGroup"/>
-                    </m:oMathParaPr>
-                    <m:oMath xmlns:m="http://schemas.openxmlformats.org/officeDocument/2006/math">
-                      <m:sSub>
-                        <m:sSubPr>
-                          <m:ctrlPr>
-                            <a:rPr lang="en-US" sz="3000" i="1" dirty="0" smtClean="0">
-                              <a:latin typeface="Cambria Math" panose="02040503050406030204" pitchFamily="18" charset="0"/>
-                            </a:rPr>
-                          </m:ctrlPr>
-                        </m:sSubPr>
-                        <m:e>
-                          <m:r>
-                            <a:rPr lang="en-GB" sz="3000" i="1" dirty="0">
-                              <a:latin typeface="Cambria Math" panose="02040503050406030204" pitchFamily="18" charset="0"/>
-                            </a:rPr>
-                            <m:t>4</m:t>
-                          </m:r>
-                          <m:r>
-                            <a:rPr lang="en-GB" sz="3000" b="0" i="1" dirty="0" smtClean="0">
-                              <a:latin typeface="Cambria Math" panose="02040503050406030204" pitchFamily="18" charset="0"/>
-                            </a:rPr>
-                            <m:t>3</m:t>
-                          </m:r>
-                          <m:r>
-                            <a:rPr lang="en-GB" sz="3000" i="1" dirty="0">
-                              <a:latin typeface="Cambria Math" panose="02040503050406030204" pitchFamily="18" charset="0"/>
-                            </a:rPr>
-                            <m:t>.</m:t>
-                          </m:r>
-                          <m:r>
-                            <a:rPr lang="en-GB" sz="3000" i="1" dirty="0">
-                              <a:latin typeface="Cambria Math" panose="02040503050406030204" pitchFamily="18" charset="0"/>
-                            </a:rPr>
-                            <m:t>𝑣</m:t>
-                          </m:r>
-                        </m:e>
-                        <m:sub>
-                          <m:r>
-                            <a:rPr lang="en-GB" sz="3000" i="1" dirty="0">
-                              <a:latin typeface="Cambria Math" panose="02040503050406030204" pitchFamily="18" charset="0"/>
-                            </a:rPr>
-                            <m:t>∗</m:t>
-                          </m:r>
-                        </m:sub>
-                      </m:sSub>
-                      <m:d>
-                        <m:dPr>
-                          <m:ctrlPr>
-                            <a:rPr lang="el-GR" sz="3000" b="0" i="1" u="none" strike="noStrike" dirty="0" smtClean="0">
-                              <a:solidFill>
-                                <a:srgbClr val="000000"/>
-                              </a:solidFill>
-                              <a:effectLst/>
-                              <a:latin typeface="Cambria Math" panose="02040503050406030204" pitchFamily="18" charset="0"/>
-                            </a:rPr>
-                          </m:ctrlPr>
-                        </m:dPr>
-                        <m:e>
-                          <m:r>
-                            <a:rPr lang="en-GB" sz="3000" b="0" i="1" u="none" strike="noStrike" dirty="0" smtClean="0">
-                              <a:solidFill>
-                                <a:srgbClr val="000000"/>
-                              </a:solidFill>
-                              <a:effectLst/>
-                              <a:latin typeface="Cambria Math" panose="02040503050406030204" pitchFamily="18" charset="0"/>
-                            </a:rPr>
-                            <m:t>𝐻</m:t>
-                          </m:r>
-                        </m:e>
-                      </m:d>
-                      <m:r>
-                        <a:rPr lang="en-PH" sz="3000" b="0" i="1" u="none" strike="noStrike" dirty="0" smtClean="0">
-                          <a:solidFill>
-                            <a:srgbClr val="000000"/>
-                          </a:solidFill>
-                          <a:effectLst/>
-                          <a:latin typeface="Cambria Math" panose="02040503050406030204" pitchFamily="18" charset="0"/>
-                        </a:rPr>
-                        <m:t>=</m:t>
-                      </m:r>
-                      <m:r>
-                        <a:rPr lang="en-GB" sz="3000" b="0" i="1" u="none" strike="noStrike" dirty="0" smtClean="0">
-                          <a:solidFill>
-                            <a:srgbClr val="000000"/>
-                          </a:solidFill>
-                          <a:effectLst/>
-                          <a:latin typeface="Cambria Math" panose="02040503050406030204" pitchFamily="18" charset="0"/>
-                        </a:rPr>
-                        <m:t> ?</m:t>
-                      </m:r>
-                    </m:oMath>
-                  </m:oMathPara>
-                </a14:m>
-                <a:endParaRPr lang="en-US" sz="3000" dirty="0"/>
-              </a:p>
-            </p:txBody>
-          </p:sp>
-        </mc:Choice>
-        <mc:Fallback>
-          <p:sp>
-            <p:nvSpPr>
-              <p:cNvPr id="23" name="TextBox 22">
-                <a:extLst>
-                  <a:ext uri="{FF2B5EF4-FFF2-40B4-BE49-F238E27FC236}">
-                    <a16:creationId xmlns:a16="http://schemas.microsoft.com/office/drawing/2014/main" id="{FE433754-7496-66CB-5ACE-B08C37301D0C}"/>
-                  </a:ext>
-                </a:extLst>
-              </p:cNvPr>
-              <p:cNvSpPr txBox="1">
-                <a:spLocks noRot="1" noChangeAspect="1" noMove="1" noResize="1" noEditPoints="1" noAdjustHandles="1" noChangeArrowheads="1" noChangeShapeType="1" noTextEdit="1"/>
-              </p:cNvSpPr>
-              <p:nvPr/>
-            </p:nvSpPr>
-            <p:spPr>
-              <a:xfrm>
-                <a:off x="838198" y="5586960"/>
-                <a:ext cx="2469778" cy="553998"/>
-              </a:xfrm>
-              <a:prstGeom prst="rect">
-                <a:avLst/>
-              </a:prstGeom>
-              <a:blipFill>
-                <a:blip r:embed="rId8"/>
-                <a:stretch>
-                  <a:fillRect b="-19149"/>
+                  <a:fillRect b="-16667"/>
                 </a:stretch>
               </a:blipFill>
               <a:ln w="38100">
@@ -28916,7 +29101,7 @@
                         <a:rPr lang="en-GB" sz="3000" b="0" i="1" dirty="0" smtClean="0">
                           <a:latin typeface="Cambria Math" panose="02040503050406030204" pitchFamily="18" charset="0"/>
                         </a:rPr>
-                        <m:t>4</m:t>
+                        <m:t>5</m:t>
                       </m:r>
                       <m:r>
                         <a:rPr lang="en-GB" sz="3000" b="0" i="1" dirty="0" smtClean="0">
@@ -29130,7 +29315,7 @@
                             <a:rPr lang="en-GB" sz="3000" b="0" i="1" dirty="0" smtClean="0">
                               <a:latin typeface="Cambria Math" panose="02040503050406030204" pitchFamily="18" charset="0"/>
                             </a:rPr>
-                            <m:t>5</m:t>
+                            <m:t>6</m:t>
                           </m:r>
                           <m:r>
                             <a:rPr lang="en-GB" sz="3000" b="0" i="1" dirty="0" smtClean="0">
@@ -29334,7 +29519,7 @@
                             <a:rPr lang="en-GB" sz="3000" b="0" i="1" dirty="0" smtClean="0">
                               <a:latin typeface="Cambria Math" panose="02040503050406030204" pitchFamily="18" charset="0"/>
                             </a:rPr>
-                            <m:t>6</m:t>
+                            <m:t>7</m:t>
                           </m:r>
                           <m:r>
                             <a:rPr lang="en-GB" sz="3000" b="0" i="1" dirty="0" smtClean="0">
@@ -29493,7 +29678,7 @@
             </p:nvSpPr>
             <p:spPr>
               <a:xfrm>
-                <a:off x="838198" y="4806694"/>
+                <a:off x="838198" y="5405979"/>
                 <a:ext cx="2819400" cy="553998"/>
               </a:xfrm>
               <a:prstGeom prst="rect">
@@ -29538,7 +29723,7 @@
                             <a:rPr lang="en-GB" sz="3000" b="0" i="1" dirty="0" smtClean="0">
                               <a:latin typeface="Cambria Math" panose="02040503050406030204" pitchFamily="18" charset="0"/>
                             </a:rPr>
-                            <m:t>7</m:t>
+                            <m:t>9</m:t>
                           </m:r>
                           <m:r>
                             <a:rPr lang="en-GB" sz="3000" b="0" i="1" dirty="0" smtClean="0">
@@ -29648,7 +29833,7 @@
             </p:nvSpPr>
             <p:spPr>
               <a:xfrm>
-                <a:off x="838198" y="4806694"/>
+                <a:off x="838198" y="5405979"/>
                 <a:ext cx="2819400" cy="553998"/>
               </a:xfrm>
               <a:prstGeom prst="rect">
@@ -29657,7 +29842,7 @@
               <a:blipFill>
                 <a:blip r:embed="rId7"/>
                 <a:stretch>
-                  <a:fillRect b="-18750"/>
+                  <a:fillRect b="-19149"/>
                 </a:stretch>
               </a:blipFill>
               <a:ln w="38100">
@@ -29697,7 +29882,205 @@
             </p:nvSpPr>
             <p:spPr>
               <a:xfrm>
-                <a:off x="838198" y="5518093"/>
+                <a:off x="838198" y="6117378"/>
+                <a:ext cx="2819400" cy="553998"/>
+              </a:xfrm>
+              <a:prstGeom prst="rect">
+                <a:avLst/>
+              </a:prstGeom>
+              <a:noFill/>
+              <a:ln w="38100">
+                <a:solidFill>
+                  <a:schemeClr val="tx1"/>
+                </a:solidFill>
+              </a:ln>
+            </p:spPr>
+            <p:txBody>
+              <a:bodyPr wrap="square">
+                <a:spAutoFit/>
+              </a:bodyPr>
+              <a:lstStyle/>
+              <a:p>
+                <a:pPr/>
+                <a14:m>
+                  <m:oMathPara xmlns:m="http://schemas.openxmlformats.org/officeDocument/2006/math">
+                    <m:oMathParaPr>
+                      <m:jc m:val="centerGroup"/>
+                    </m:oMathParaPr>
+                    <m:oMath xmlns:m="http://schemas.openxmlformats.org/officeDocument/2006/math">
+                      <m:sSub>
+                        <m:sSubPr>
+                          <m:ctrlPr>
+                            <a:rPr lang="en-US" sz="3000" i="1" dirty="0" smtClean="0">
+                              <a:latin typeface="Cambria Math" panose="02040503050406030204" pitchFamily="18" charset="0"/>
+                            </a:rPr>
+                          </m:ctrlPr>
+                        </m:sSubPr>
+                        <m:e>
+                          <m:r>
+                            <a:rPr lang="en-GB" sz="3000" b="0" i="1" dirty="0" smtClean="0">
+                              <a:latin typeface="Cambria Math" panose="02040503050406030204" pitchFamily="18" charset="0"/>
+                            </a:rPr>
+                            <m:t>50</m:t>
+                          </m:r>
+                          <m:r>
+                            <a:rPr lang="en-GB" sz="3000" b="0" i="1" dirty="0" smtClean="0">
+                              <a:latin typeface="Cambria Math" panose="02040503050406030204" pitchFamily="18" charset="0"/>
+                            </a:rPr>
+                            <m:t>.</m:t>
+                          </m:r>
+                          <m:r>
+                            <a:rPr lang="en-GB" sz="3000" b="0" i="1" dirty="0" smtClean="0">
+                              <a:latin typeface="Cambria Math" panose="02040503050406030204" pitchFamily="18" charset="0"/>
+                            </a:rPr>
+                            <m:t>𝑞</m:t>
+                          </m:r>
+                        </m:e>
+                        <m:sub>
+                          <m:r>
+                            <a:rPr lang="en-GB" sz="3000" b="0" i="1" dirty="0" smtClean="0">
+                              <a:latin typeface="Cambria Math" panose="02040503050406030204" pitchFamily="18" charset="0"/>
+                            </a:rPr>
+                            <m:t>∗</m:t>
+                          </m:r>
+                        </m:sub>
+                      </m:sSub>
+                      <m:d>
+                        <m:dPr>
+                          <m:ctrlPr>
+                            <a:rPr lang="el-GR" sz="3000" b="0" i="1" u="none" strike="noStrike" dirty="0" smtClean="0">
+                              <a:solidFill>
+                                <a:srgbClr val="000000"/>
+                              </a:solidFill>
+                              <a:effectLst/>
+                              <a:latin typeface="Cambria Math" panose="02040503050406030204" pitchFamily="18" charset="0"/>
+                            </a:rPr>
+                          </m:ctrlPr>
+                        </m:dPr>
+                        <m:e>
+                          <m:r>
+                            <a:rPr lang="en-GB" sz="3000" b="0" i="1" u="none" strike="noStrike" dirty="0" smtClean="0">
+                              <a:solidFill>
+                                <a:srgbClr val="000000"/>
+                              </a:solidFill>
+                              <a:effectLst/>
+                              <a:latin typeface="Cambria Math" panose="02040503050406030204" pitchFamily="18" charset="0"/>
+                            </a:rPr>
+                            <m:t>𝐻</m:t>
+                          </m:r>
+                          <m:r>
+                            <a:rPr lang="en-GB" sz="2800" i="1" dirty="0">
+                              <a:solidFill>
+                                <a:srgbClr val="000000"/>
+                              </a:solidFill>
+                              <a:latin typeface="Cambria Math" panose="02040503050406030204" pitchFamily="18" charset="0"/>
+                            </a:rPr>
+                            <m:t>|</m:t>
+                          </m:r>
+                          <m:r>
+                            <a:rPr lang="en-GB" sz="2800" i="1">
+                              <a:latin typeface="Cambria Math" panose="02040503050406030204" pitchFamily="18" charset="0"/>
+                              <a:ea typeface="Cambria Math" panose="02040503050406030204" pitchFamily="18" charset="0"/>
+                            </a:rPr>
+                            <m:t>𝒜</m:t>
+                          </m:r>
+                        </m:e>
+                      </m:d>
+                      <m:r>
+                        <a:rPr lang="en-PH" sz="3000" b="0" i="1" u="none" strike="noStrike" dirty="0">
+                          <a:solidFill>
+                            <a:srgbClr val="000000"/>
+                          </a:solidFill>
+                          <a:effectLst/>
+                          <a:latin typeface="Cambria Math" panose="02040503050406030204" pitchFamily="18" charset="0"/>
+                        </a:rPr>
+                        <m:t>=</m:t>
+                      </m:r>
+                      <m:r>
+                        <a:rPr lang="en-GB" sz="3000" b="0" i="1" u="none" strike="noStrike" dirty="0" smtClean="0">
+                          <a:solidFill>
+                            <a:srgbClr val="000000"/>
+                          </a:solidFill>
+                          <a:effectLst/>
+                          <a:latin typeface="Cambria Math" panose="02040503050406030204" pitchFamily="18" charset="0"/>
+                        </a:rPr>
+                        <m:t> ?</m:t>
+                      </m:r>
+                    </m:oMath>
+                  </m:oMathPara>
+                </a14:m>
+                <a:endParaRPr lang="en-US" sz="3000" dirty="0"/>
+              </a:p>
+            </p:txBody>
+          </p:sp>
+        </mc:Choice>
+        <mc:Fallback>
+          <p:sp>
+            <p:nvSpPr>
+              <p:cNvPr id="2" name="TextBox 1">
+                <a:extLst>
+                  <a:ext uri="{FF2B5EF4-FFF2-40B4-BE49-F238E27FC236}">
+                    <a16:creationId xmlns:a16="http://schemas.microsoft.com/office/drawing/2014/main" id="{F092EE40-514B-2B06-EAF8-2CB5E27FB3CF}"/>
+                  </a:ext>
+                </a:extLst>
+              </p:cNvPr>
+              <p:cNvSpPr txBox="1">
+                <a:spLocks noRot="1" noChangeAspect="1" noMove="1" noResize="1" noEditPoints="1" noAdjustHandles="1" noChangeArrowheads="1" noChangeShapeType="1" noTextEdit="1"/>
+              </p:cNvSpPr>
+              <p:nvPr/>
+            </p:nvSpPr>
+            <p:spPr>
+              <a:xfrm>
+                <a:off x="838198" y="6117378"/>
+                <a:ext cx="2819400" cy="553998"/>
+              </a:xfrm>
+              <a:prstGeom prst="rect">
+                <a:avLst/>
+              </a:prstGeom>
+              <a:blipFill>
+                <a:blip r:embed="rId8"/>
+                <a:stretch>
+                  <a:fillRect l="-442" b="-19149"/>
+                </a:stretch>
+              </a:blipFill>
+              <a:ln w="38100">
+                <a:solidFill>
+                  <a:schemeClr val="tx1"/>
+                </a:solidFill>
+              </a:ln>
+            </p:spPr>
+            <p:txBody>
+              <a:bodyPr/>
+              <a:lstStyle/>
+              <a:p>
+                <a:r>
+                  <a:rPr lang="en-US">
+                    <a:noFill/>
+                  </a:rPr>
+                  <a:t> </a:t>
+                </a:r>
+              </a:p>
+            </p:txBody>
+          </p:sp>
+        </mc:Fallback>
+      </mc:AlternateContent>
+      <mc:AlternateContent xmlns:mc="http://schemas.openxmlformats.org/markup-compatibility/2006">
+        <mc:Choice xmlns:a14="http://schemas.microsoft.com/office/drawing/2010/main" Requires="a14">
+          <p:sp>
+            <p:nvSpPr>
+              <p:cNvPr id="3" name="TextBox 2">
+                <a:extLst>
+                  <a:ext uri="{FF2B5EF4-FFF2-40B4-BE49-F238E27FC236}">
+                    <a16:creationId xmlns:a16="http://schemas.microsoft.com/office/drawing/2014/main" id="{B23450BA-A625-3AAA-FCB7-40F13F0E0ACF}"/>
+                  </a:ext>
+                </a:extLst>
+              </p:cNvPr>
+              <p:cNvSpPr txBox="1"/>
+              <p:nvPr/>
+            </p:nvSpPr>
+            <p:spPr>
+              <a:xfrm>
+                <a:off x="838198" y="4649293"/>
                 <a:ext cx="2819400" cy="553998"/>
               </a:xfrm>
               <a:prstGeom prst="rect">
@@ -29787,7 +30170,7 @@
                               <a:effectLst/>
                               <a:latin typeface="Cambria Math" panose="02040503050406030204" pitchFamily="18" charset="0"/>
                             </a:rPr>
-                            <m:t>𝐻</m:t>
+                            <m:t>𝐸</m:t>
                           </m:r>
                           <m:r>
                             <a:rPr lang="en-GB" sz="2800" i="1" dirty="0">
@@ -29838,10 +30221,10 @@
         <mc:Fallback>
           <p:sp>
             <p:nvSpPr>
-              <p:cNvPr id="2" name="TextBox 1">
+              <p:cNvPr id="3" name="TextBox 2">
                 <a:extLst>
                   <a:ext uri="{FF2B5EF4-FFF2-40B4-BE49-F238E27FC236}">
-                    <a16:creationId xmlns:a16="http://schemas.microsoft.com/office/drawing/2014/main" id="{F092EE40-514B-2B06-EAF8-2CB5E27FB3CF}"/>
+                    <a16:creationId xmlns:a16="http://schemas.microsoft.com/office/drawing/2014/main" id="{B23450BA-A625-3AAA-FCB7-40F13F0E0ACF}"/>
                   </a:ext>
                 </a:extLst>
               </p:cNvPr>
@@ -29852,16 +30235,16 @@
             </p:nvSpPr>
             <p:spPr>
               <a:xfrm>
-                <a:off x="838198" y="5518093"/>
+                <a:off x="838198" y="4649293"/>
                 <a:ext cx="2819400" cy="553998"/>
               </a:xfrm>
               <a:prstGeom prst="rect">
                 <a:avLst/>
               </a:prstGeom>
               <a:blipFill>
-                <a:blip r:embed="rId8"/>
+                <a:blip r:embed="rId9"/>
                 <a:stretch>
-                  <a:fillRect b="-18750"/>
+                  <a:fillRect b="-16667"/>
                 </a:stretch>
               </a:blipFill>
               <a:ln w="38100">
@@ -30402,7 +30785,7 @@
               <a:p>
                 <a:r>
                   <a:rPr lang="en-US" sz="3000" dirty="0"/>
-                  <a:t>49. </a:t>
+                  <a:t> 51. </a:t>
                 </a:r>
                 <a14:m>
                   <m:oMath xmlns:m="http://schemas.openxmlformats.org/officeDocument/2006/math">
@@ -30512,7 +30895,7 @@
               <a:blipFill>
                 <a:blip r:embed="rId4"/>
                 <a:stretch>
-                  <a:fillRect l="-4523" t="-8511" b="-27660"/>
+                  <a:fillRect l="-2010" t="-8511" b="-27660"/>
                 </a:stretch>
               </a:blipFill>
               <a:ln w="38100">
@@ -30590,7 +30973,7 @@
                             <a:rPr lang="en-GB" sz="3000" b="0" i="1" dirty="0" smtClean="0">
                               <a:latin typeface="Cambria Math" panose="02040503050406030204" pitchFamily="18" charset="0"/>
                             </a:rPr>
-                            <m:t>50. </m:t>
+                            <m:t>52 </m:t>
                           </m:r>
                           <m:r>
                             <a:rPr lang="el-GR" sz="3000" i="1" dirty="0">
@@ -30765,7 +31148,7 @@
                         <a:rPr lang="en-GB" sz="3000" b="0" i="1" dirty="0" smtClean="0">
                           <a:latin typeface="Cambria Math" panose="02040503050406030204" pitchFamily="18" charset="0"/>
                         </a:rPr>
-                        <m:t>1.  </m:t>
+                        <m:t>3.  </m:t>
                       </m:r>
                       <m:sSub>
                         <m:sSubPr>
@@ -30914,7 +31297,7 @@
             </p:nvSpPr>
             <p:spPr>
               <a:xfrm>
-                <a:off x="838198" y="4802273"/>
+                <a:off x="838198" y="5467160"/>
                 <a:ext cx="2631143" cy="553998"/>
               </a:xfrm>
               <a:prstGeom prst="rect">
@@ -30952,7 +31335,7 @@
                             <a:rPr lang="en-GB" sz="3000" b="0" i="1" dirty="0" smtClean="0">
                               <a:latin typeface="Cambria Math" panose="02040503050406030204" pitchFamily="18" charset="0"/>
                             </a:rPr>
-                            <m:t>52. </m:t>
+                            <m:t>55. </m:t>
                           </m:r>
                           <m:r>
                             <a:rPr lang="el-GR" sz="3000" i="1" dirty="0">
@@ -31053,7 +31436,7 @@
             </p:nvSpPr>
             <p:spPr>
               <a:xfrm>
-                <a:off x="838198" y="4802273"/>
+                <a:off x="838198" y="5467160"/>
                 <a:ext cx="2631143" cy="553998"/>
               </a:xfrm>
               <a:prstGeom prst="rect">
@@ -31062,7 +31445,7 @@
               <a:blipFill>
                 <a:blip r:embed="rId7"/>
                 <a:stretch>
-                  <a:fillRect b="-16667"/>
+                  <a:fillRect b="-17021"/>
                 </a:stretch>
               </a:blipFill>
               <a:ln w="38100">
@@ -31102,7 +31485,7 @@
             </p:nvSpPr>
             <p:spPr>
               <a:xfrm>
-                <a:off x="838198" y="5591759"/>
+                <a:off x="838198" y="6256646"/>
                 <a:ext cx="2631143" cy="553998"/>
               </a:xfrm>
               <a:prstGeom prst="rect">
@@ -31140,7 +31523,7 @@
                             <a:rPr lang="en-GB" sz="3000" b="0" i="1" dirty="0" smtClean="0">
                               <a:latin typeface="Cambria Math" panose="02040503050406030204" pitchFamily="18" charset="0"/>
                             </a:rPr>
-                            <m:t>53. </m:t>
+                            <m:t>56. </m:t>
                           </m:r>
                           <m:r>
                             <a:rPr lang="el-GR" sz="3000" i="1" dirty="0">
@@ -31241,7 +31624,7 @@
             </p:nvSpPr>
             <p:spPr>
               <a:xfrm>
-                <a:off x="838198" y="5591759"/>
+                <a:off x="838198" y="6256646"/>
                 <a:ext cx="2631143" cy="553998"/>
               </a:xfrm>
               <a:prstGeom prst="rect">
@@ -31250,7 +31633,195 @@
               <a:blipFill>
                 <a:blip r:embed="rId8"/>
                 <a:stretch>
-                  <a:fillRect b="-16667"/>
+                  <a:fillRect b="-19149"/>
+                </a:stretch>
+              </a:blipFill>
+              <a:ln w="38100">
+                <a:solidFill>
+                  <a:schemeClr val="tx1"/>
+                </a:solidFill>
+              </a:ln>
+            </p:spPr>
+            <p:txBody>
+              <a:bodyPr/>
+              <a:lstStyle/>
+              <a:p>
+                <a:r>
+                  <a:rPr lang="en-US">
+                    <a:noFill/>
+                  </a:rPr>
+                  <a:t> </a:t>
+                </a:r>
+              </a:p>
+            </p:txBody>
+          </p:sp>
+        </mc:Fallback>
+      </mc:AlternateContent>
+      <mc:AlternateContent xmlns:mc="http://schemas.openxmlformats.org/markup-compatibility/2006">
+        <mc:Choice xmlns:a14="http://schemas.microsoft.com/office/drawing/2010/main" Requires="a14">
+          <p:sp>
+            <p:nvSpPr>
+              <p:cNvPr id="19" name="TextBox 18">
+                <a:extLst>
+                  <a:ext uri="{FF2B5EF4-FFF2-40B4-BE49-F238E27FC236}">
+                    <a16:creationId xmlns:a16="http://schemas.microsoft.com/office/drawing/2014/main" id="{55734183-9D6C-B38E-561B-5A77AD614167}"/>
+                  </a:ext>
+                </a:extLst>
+              </p:cNvPr>
+              <p:cNvSpPr txBox="1"/>
+              <p:nvPr/>
+            </p:nvSpPr>
+            <p:spPr>
+              <a:xfrm>
+                <a:off x="838197" y="4696546"/>
+                <a:ext cx="2631143" cy="553998"/>
+              </a:xfrm>
+              <a:prstGeom prst="rect">
+                <a:avLst/>
+              </a:prstGeom>
+              <a:noFill/>
+              <a:ln w="38100">
+                <a:solidFill>
+                  <a:schemeClr val="tx1"/>
+                </a:solidFill>
+              </a:ln>
+            </p:spPr>
+            <p:txBody>
+              <a:bodyPr wrap="square">
+                <a:spAutoFit/>
+              </a:bodyPr>
+              <a:lstStyle/>
+              <a:p>
+                <a14:m>
+                  <m:oMathPara xmlns:m="http://schemas.openxmlformats.org/officeDocument/2006/math">
+                    <m:oMathParaPr>
+                      <m:jc m:val="centerGroup"/>
+                    </m:oMathParaPr>
+                    <m:oMath xmlns:m="http://schemas.openxmlformats.org/officeDocument/2006/math">
+                      <m:sSub>
+                        <m:sSubPr>
+                          <m:ctrlPr>
+                            <a:rPr lang="en-US" sz="3000" i="1" dirty="0" smtClean="0">
+                              <a:latin typeface="Cambria Math" panose="02040503050406030204" pitchFamily="18" charset="0"/>
+                            </a:rPr>
+                          </m:ctrlPr>
+                        </m:sSubPr>
+                        <m:e>
+                          <m:r>
+                            <a:rPr lang="en-GB" sz="3000" b="0" i="1" dirty="0" smtClean="0">
+                              <a:latin typeface="Cambria Math" panose="02040503050406030204" pitchFamily="18" charset="0"/>
+                            </a:rPr>
+                            <m:t>54. </m:t>
+                          </m:r>
+                          <m:r>
+                            <a:rPr lang="el-GR" sz="3000" i="1" dirty="0">
+                              <a:solidFill>
+                                <a:srgbClr val="000000"/>
+                              </a:solidFill>
+                              <a:latin typeface="Cambria Math" panose="02040503050406030204" pitchFamily="18" charset="0"/>
+                            </a:rPr>
+                            <m:t>𝜋</m:t>
+                          </m:r>
+                        </m:e>
+                        <m:sub>
+                          <m:r>
+                            <a:rPr lang="en-GB" sz="3000" b="0" i="1" dirty="0" smtClean="0">
+                              <a:latin typeface="Cambria Math" panose="02040503050406030204" pitchFamily="18" charset="0"/>
+                            </a:rPr>
+                            <m:t>∗</m:t>
+                          </m:r>
+                        </m:sub>
+                      </m:sSub>
+                      <m:r>
+                        <a:rPr lang="el-GR" sz="3000" b="0" i="1" u="none" strike="noStrike" dirty="0" smtClean="0">
+                          <a:solidFill>
+                            <a:srgbClr val="000000"/>
+                          </a:solidFill>
+                          <a:effectLst/>
+                          <a:latin typeface="Cambria Math" panose="02040503050406030204" pitchFamily="18" charset="0"/>
+                        </a:rPr>
+                        <m:t> </m:t>
+                      </m:r>
+                      <m:d>
+                        <m:dPr>
+                          <m:ctrlPr>
+                            <a:rPr lang="el-GR" sz="3000" b="0" i="1" u="none" strike="noStrike" dirty="0" smtClean="0">
+                              <a:solidFill>
+                                <a:srgbClr val="000000"/>
+                              </a:solidFill>
+                              <a:effectLst/>
+                              <a:latin typeface="Cambria Math" panose="02040503050406030204" pitchFamily="18" charset="0"/>
+                            </a:rPr>
+                          </m:ctrlPr>
+                        </m:dPr>
+                        <m:e>
+                          <m:r>
+                            <a:rPr lang="en-GB" sz="3000" b="0" i="1" u="none" strike="noStrike" dirty="0" smtClean="0">
+                              <a:solidFill>
+                                <a:srgbClr val="000000"/>
+                              </a:solidFill>
+                              <a:effectLst/>
+                              <a:latin typeface="Cambria Math" panose="02040503050406030204" pitchFamily="18" charset="0"/>
+                            </a:rPr>
+                            <m:t>𝐸</m:t>
+                          </m:r>
+                        </m:e>
+                      </m:d>
+                      <m:r>
+                        <a:rPr lang="en-PH" sz="3000" b="0" i="1" u="none" strike="noStrike" dirty="0">
+                          <a:solidFill>
+                            <a:srgbClr val="000000"/>
+                          </a:solidFill>
+                          <a:effectLst/>
+                          <a:latin typeface="Cambria Math" panose="02040503050406030204" pitchFamily="18" charset="0"/>
+                        </a:rPr>
+                        <m:t>=</m:t>
+                      </m:r>
+                      <m:r>
+                        <a:rPr lang="en-GB" sz="3000" b="0" i="1" u="none" strike="noStrike" dirty="0" smtClean="0">
+                          <a:solidFill>
+                            <a:srgbClr val="000000"/>
+                          </a:solidFill>
+                          <a:effectLst/>
+                          <a:latin typeface="Cambria Math" panose="02040503050406030204" pitchFamily="18" charset="0"/>
+                        </a:rPr>
+                        <m:t> ?</m:t>
+                      </m:r>
+                    </m:oMath>
+                  </m:oMathPara>
+                </a14:m>
+                <a:endParaRPr lang="en-US" sz="3000" dirty="0"/>
+              </a:p>
+            </p:txBody>
+          </p:sp>
+        </mc:Choice>
+        <mc:Fallback>
+          <p:sp>
+            <p:nvSpPr>
+              <p:cNvPr id="19" name="TextBox 18">
+                <a:extLst>
+                  <a:ext uri="{FF2B5EF4-FFF2-40B4-BE49-F238E27FC236}">
+                    <a16:creationId xmlns:a16="http://schemas.microsoft.com/office/drawing/2014/main" id="{55734183-9D6C-B38E-561B-5A77AD614167}"/>
+                  </a:ext>
+                </a:extLst>
+              </p:cNvPr>
+              <p:cNvSpPr txBox="1">
+                <a:spLocks noRot="1" noChangeAspect="1" noMove="1" noResize="1" noEditPoints="1" noAdjustHandles="1" noChangeArrowheads="1" noChangeShapeType="1" noTextEdit="1"/>
+              </p:cNvSpPr>
+              <p:nvPr/>
+            </p:nvSpPr>
+            <p:spPr>
+              <a:xfrm>
+                <a:off x="838197" y="4696546"/>
+                <a:ext cx="2631143" cy="553998"/>
+              </a:xfrm>
+              <a:prstGeom prst="rect">
+                <a:avLst/>
+              </a:prstGeom>
+              <a:blipFill>
+                <a:blip r:embed="rId9"/>
+                <a:stretch>
+                  <a:fillRect b="-19149"/>
                 </a:stretch>
               </a:blipFill>
               <a:ln w="38100">
@@ -31779,7 +32350,7 @@
                           </a:solidFill>
                           <a:latin typeface="Cambria Math" panose="02040503050406030204" pitchFamily="18" charset="0"/>
                         </a:rPr>
-                        <m:t>4. </m:t>
+                        <m:t>7. </m:t>
                       </m:r>
                       <m:r>
                         <a:rPr lang="en-GB" b="0" i="1" dirty="0" smtClean="0">
@@ -32050,7 +32621,7 @@
                           </a:solidFill>
                           <a:latin typeface="Cambria Math" panose="02040503050406030204" pitchFamily="18" charset="0"/>
                         </a:rPr>
-                        <m:t>5. </m:t>
+                        <m:t>8. </m:t>
                       </m:r>
                       <m:r>
                         <a:rPr lang="en-GB" b="0" i="1" dirty="0" smtClean="0">

</xml_diff>